<commit_message>
load editors based on job level
</commit_message>
<xml_diff>
--- a/resources/LIST EDITORS BY JOB LEVEL.pptx
+++ b/resources/LIST EDITORS BY JOB LEVEL.pptx
@@ -5,7 +5,7 @@
     <p:sldMasterId id="2147483648" r:id="rId1"/>
   </p:sldMasterIdLst>
   <p:sldIdLst>
-    <p:sldId id="256" r:id="rId2"/>
+    <p:sldId id="257" r:id="rId2"/>
   </p:sldIdLst>
   <p:sldSz cx="12192000" cy="6858000"/>
   <p:notesSz cx="6858000" cy="9144000"/>
@@ -104,6 +104,11 @@
       </a:defRPr>
     </a:lvl9pPr>
   </p:defaultTextStyle>
+  <p:extLst>
+    <p:ext uri="{EFAFB233-063F-42B5-8137-9DF3F51BA10A}">
+      <p15:sldGuideLst xmlns:p15="http://schemas.microsoft.com/office/powerpoint/2012/main"/>
+    </p:ext>
+  </p:extLst>
 </p:presentation>
 </file>
 
@@ -238,7 +243,7 @@
           <a:p>
             <a:fld id="{2FAD2E74-FC25-4C6E-B4E5-44F4FB71815B}" type="datetimeFigureOut">
               <a:rPr lang="en-US" smtClean="0"/>
-              <a:t>5/30/2022</a:t>
+              <a:t>6/2/2022</a:t>
             </a:fld>
             <a:endParaRPr lang="en-US"/>
           </a:p>
@@ -408,7 +413,7 @@
           <a:p>
             <a:fld id="{2FAD2E74-FC25-4C6E-B4E5-44F4FB71815B}" type="datetimeFigureOut">
               <a:rPr lang="en-US" smtClean="0"/>
-              <a:t>5/30/2022</a:t>
+              <a:t>6/2/2022</a:t>
             </a:fld>
             <a:endParaRPr lang="en-US"/>
           </a:p>
@@ -588,7 +593,7 @@
           <a:p>
             <a:fld id="{2FAD2E74-FC25-4C6E-B4E5-44F4FB71815B}" type="datetimeFigureOut">
               <a:rPr lang="en-US" smtClean="0"/>
-              <a:t>5/30/2022</a:t>
+              <a:t>6/2/2022</a:t>
             </a:fld>
             <a:endParaRPr lang="en-US"/>
           </a:p>
@@ -758,7 +763,7 @@
           <a:p>
             <a:fld id="{2FAD2E74-FC25-4C6E-B4E5-44F4FB71815B}" type="datetimeFigureOut">
               <a:rPr lang="en-US" smtClean="0"/>
-              <a:t>5/30/2022</a:t>
+              <a:t>6/2/2022</a:t>
             </a:fld>
             <a:endParaRPr lang="en-US"/>
           </a:p>
@@ -1004,7 +1009,7 @@
           <a:p>
             <a:fld id="{2FAD2E74-FC25-4C6E-B4E5-44F4FB71815B}" type="datetimeFigureOut">
               <a:rPr lang="en-US" smtClean="0"/>
-              <a:t>5/30/2022</a:t>
+              <a:t>6/2/2022</a:t>
             </a:fld>
             <a:endParaRPr lang="en-US"/>
           </a:p>
@@ -1236,7 +1241,7 @@
           <a:p>
             <a:fld id="{2FAD2E74-FC25-4C6E-B4E5-44F4FB71815B}" type="datetimeFigureOut">
               <a:rPr lang="en-US" smtClean="0"/>
-              <a:t>5/30/2022</a:t>
+              <a:t>6/2/2022</a:t>
             </a:fld>
             <a:endParaRPr lang="en-US"/>
           </a:p>
@@ -1603,7 +1608,7 @@
           <a:p>
             <a:fld id="{2FAD2E74-FC25-4C6E-B4E5-44F4FB71815B}" type="datetimeFigureOut">
               <a:rPr lang="en-US" smtClean="0"/>
-              <a:t>5/30/2022</a:t>
+              <a:t>6/2/2022</a:t>
             </a:fld>
             <a:endParaRPr lang="en-US"/>
           </a:p>
@@ -1721,7 +1726,7 @@
           <a:p>
             <a:fld id="{2FAD2E74-FC25-4C6E-B4E5-44F4FB71815B}" type="datetimeFigureOut">
               <a:rPr lang="en-US" smtClean="0"/>
-              <a:t>5/30/2022</a:t>
+              <a:t>6/2/2022</a:t>
             </a:fld>
             <a:endParaRPr lang="en-US"/>
           </a:p>
@@ -1816,7 +1821,7 @@
           <a:p>
             <a:fld id="{2FAD2E74-FC25-4C6E-B4E5-44F4FB71815B}" type="datetimeFigureOut">
               <a:rPr lang="en-US" smtClean="0"/>
-              <a:t>5/30/2022</a:t>
+              <a:t>6/2/2022</a:t>
             </a:fld>
             <a:endParaRPr lang="en-US"/>
           </a:p>
@@ -2093,7 +2098,7 @@
           <a:p>
             <a:fld id="{2FAD2E74-FC25-4C6E-B4E5-44F4FB71815B}" type="datetimeFigureOut">
               <a:rPr lang="en-US" smtClean="0"/>
-              <a:t>5/30/2022</a:t>
+              <a:t>6/2/2022</a:t>
             </a:fld>
             <a:endParaRPr lang="en-US"/>
           </a:p>
@@ -2346,7 +2351,7 @@
           <a:p>
             <a:fld id="{2FAD2E74-FC25-4C6E-B4E5-44F4FB71815B}" type="datetimeFigureOut">
               <a:rPr lang="en-US" smtClean="0"/>
-              <a:t>5/30/2022</a:t>
+              <a:t>6/2/2022</a:t>
             </a:fld>
             <a:endParaRPr lang="en-US"/>
           </a:p>
@@ -2559,7 +2564,7 @@
           <a:p>
             <a:fld id="{2FAD2E74-FC25-4C6E-B4E5-44F4FB71815B}" type="datetimeFigureOut">
               <a:rPr lang="en-US" smtClean="0"/>
-              <a:t>5/30/2022</a:t>
+              <a:t>6/2/2022</a:t>
             </a:fld>
             <a:endParaRPr lang="en-US"/>
           </a:p>
@@ -2966,14 +2971,14 @@
       </p:grpSpPr>
       <p:sp>
         <p:nvSpPr>
-          <p:cNvPr id="4" name="Rectangle 3"/>
+          <p:cNvPr id="5" name="Rectangle 4"/>
           <p:cNvSpPr/>
           <p:nvPr/>
         </p:nvSpPr>
         <p:spPr>
           <a:xfrm>
-            <a:off x="160316" y="250528"/>
-            <a:ext cx="1945179" cy="1338349"/>
+            <a:off x="4779818" y="1271844"/>
+            <a:ext cx="1629295" cy="764771"/>
           </a:xfrm>
           <a:prstGeom prst="rect">
             <a:avLst/>
@@ -3002,22 +3007,196 @@
             <a:pPr algn="ctr"/>
             <a:r>
               <a:rPr lang="en-US" dirty="0" smtClean="0"/>
-              <a:t>MODULE</a:t>
+              <a:t>User</a:t>
             </a:r>
             <a:endParaRPr lang="en-US" dirty="0"/>
           </a:p>
         </p:txBody>
       </p:sp>
-      <p:sp>
-        <p:nvSpPr>
-          <p:cNvPr id="5" name="Rectangle 4"/>
+      <p:cxnSp>
+        <p:nvCxnSpPr>
+          <p:cNvPr id="8" name="Straight Arrow Connector 7"/>
+          <p:cNvCxnSpPr>
+            <a:endCxn id="5" idx="3"/>
+          </p:cNvCxnSpPr>
+          <p:nvPr/>
+        </p:nvCxnSpPr>
+        <p:spPr>
+          <a:xfrm flipH="1">
+            <a:off x="6409113" y="1654229"/>
+            <a:ext cx="1072342" cy="1"/>
+          </a:xfrm>
+          <a:prstGeom prst="straightConnector1">
+            <a:avLst/>
+          </a:prstGeom>
+          <a:ln>
+            <a:tailEnd type="triangle"/>
+          </a:ln>
+        </p:spPr>
+        <p:style>
+          <a:lnRef idx="1">
+            <a:schemeClr val="accent1"/>
+          </a:lnRef>
+          <a:fillRef idx="0">
+            <a:schemeClr val="accent1"/>
+          </a:fillRef>
+          <a:effectRef idx="0">
+            <a:schemeClr val="accent1"/>
+          </a:effectRef>
+          <a:fontRef idx="minor">
+            <a:schemeClr val="tx1"/>
+          </a:fontRef>
+        </p:style>
+      </p:cxnSp>
+      <p:grpSp>
+        <p:nvGrpSpPr>
+          <p:cNvPr id="81" name="Group 80"/>
+          <p:cNvGrpSpPr/>
+          <p:nvPr/>
+        </p:nvGrpSpPr>
+        <p:grpSpPr>
+          <a:xfrm>
+            <a:off x="7481454" y="1271843"/>
+            <a:ext cx="4023360" cy="764772"/>
+            <a:chOff x="7481454" y="1271843"/>
+            <a:chExt cx="4023360" cy="764772"/>
+          </a:xfrm>
+        </p:grpSpPr>
+        <p:sp>
+          <p:nvSpPr>
+            <p:cNvPr id="4" name="Rectangle 3"/>
+            <p:cNvSpPr/>
+            <p:nvPr/>
+          </p:nvSpPr>
+          <p:spPr>
+            <a:xfrm>
+              <a:off x="7481454" y="1271844"/>
+              <a:ext cx="1629295" cy="764771"/>
+            </a:xfrm>
+            <a:prstGeom prst="rect">
+              <a:avLst/>
+            </a:prstGeom>
+          </p:spPr>
+          <p:style>
+            <a:lnRef idx="2">
+              <a:schemeClr val="accent1">
+                <a:shade val="50000"/>
+              </a:schemeClr>
+            </a:lnRef>
+            <a:fillRef idx="1">
+              <a:schemeClr val="accent1"/>
+            </a:fillRef>
+            <a:effectRef idx="0">
+              <a:schemeClr val="accent1"/>
+            </a:effectRef>
+            <a:fontRef idx="minor">
+              <a:schemeClr val="lt1"/>
+            </a:fontRef>
+          </p:style>
+          <p:txBody>
+            <a:bodyPr rtlCol="0" anchor="ctr"/>
+            <a:lstStyle/>
+            <a:p>
+              <a:pPr algn="ctr"/>
+              <a:r>
+                <a:rPr lang="en-US" dirty="0" smtClean="0"/>
+                <a:t>User Module</a:t>
+              </a:r>
+              <a:endParaRPr lang="en-US" dirty="0"/>
+            </a:p>
+          </p:txBody>
+        </p:sp>
+        <p:sp>
+          <p:nvSpPr>
+            <p:cNvPr id="6" name="Rectangle 5"/>
+            <p:cNvSpPr/>
+            <p:nvPr/>
+          </p:nvSpPr>
+          <p:spPr>
+            <a:xfrm>
+              <a:off x="9875519" y="1271843"/>
+              <a:ext cx="1629295" cy="764771"/>
+            </a:xfrm>
+            <a:prstGeom prst="rect">
+              <a:avLst/>
+            </a:prstGeom>
+          </p:spPr>
+          <p:style>
+            <a:lnRef idx="2">
+              <a:schemeClr val="accent1">
+                <a:shade val="50000"/>
+              </a:schemeClr>
+            </a:lnRef>
+            <a:fillRef idx="1">
+              <a:schemeClr val="accent1"/>
+            </a:fillRef>
+            <a:effectRef idx="0">
+              <a:schemeClr val="accent1"/>
+            </a:effectRef>
+            <a:fontRef idx="minor">
+              <a:schemeClr val="lt1"/>
+            </a:fontRef>
+          </p:style>
+          <p:txBody>
+            <a:bodyPr rtlCol="0" anchor="ctr"/>
+            <a:lstStyle/>
+            <a:p>
+              <a:pPr algn="ctr"/>
+              <a:r>
+                <a:rPr lang="en-US" dirty="0" smtClean="0"/>
+                <a:t>Module</a:t>
+              </a:r>
+              <a:endParaRPr lang="en-US" dirty="0"/>
+            </a:p>
+          </p:txBody>
+        </p:sp>
+        <p:cxnSp>
+          <p:nvCxnSpPr>
+            <p:cNvPr id="10" name="Straight Arrow Connector 9"/>
+            <p:cNvCxnSpPr>
+              <a:stCxn id="4" idx="3"/>
+              <a:endCxn id="6" idx="1"/>
+            </p:cNvCxnSpPr>
+            <p:nvPr/>
+          </p:nvCxnSpPr>
+          <p:spPr>
+            <a:xfrm flipV="1">
+              <a:off x="9110749" y="1654229"/>
+              <a:ext cx="764770" cy="1"/>
+            </a:xfrm>
+            <a:prstGeom prst="straightConnector1">
+              <a:avLst/>
+            </a:prstGeom>
+            <a:ln>
+              <a:tailEnd type="triangle"/>
+            </a:ln>
+          </p:spPr>
+          <p:style>
+            <a:lnRef idx="1">
+              <a:schemeClr val="accent1"/>
+            </a:lnRef>
+            <a:fillRef idx="0">
+              <a:schemeClr val="accent1"/>
+            </a:fillRef>
+            <a:effectRef idx="0">
+              <a:schemeClr val="accent1"/>
+            </a:effectRef>
+            <a:fontRef idx="minor">
+              <a:schemeClr val="tx1"/>
+            </a:fontRef>
+          </p:style>
+        </p:cxnSp>
+      </p:grpSp>
+      <p:sp>
+        <p:nvSpPr>
+          <p:cNvPr id="18" name="Rectangle 17"/>
           <p:cNvSpPr/>
           <p:nvPr/>
         </p:nvSpPr>
         <p:spPr>
           <a:xfrm>
-            <a:off x="5888634" y="250528"/>
-            <a:ext cx="1945179" cy="1338349"/>
+            <a:off x="4779817" y="2560317"/>
+            <a:ext cx="1629295" cy="764771"/>
           </a:xfrm>
           <a:prstGeom prst="rect">
             <a:avLst/>
@@ -3046,22 +3225,130 @@
             <a:pPr algn="ctr"/>
             <a:r>
               <a:rPr lang="en-US" dirty="0" smtClean="0"/>
-              <a:t>JOB LEVEL</a:t>
+              <a:t>User Group</a:t>
             </a:r>
             <a:endParaRPr lang="en-US" dirty="0"/>
           </a:p>
         </p:txBody>
       </p:sp>
-      <p:sp>
-        <p:nvSpPr>
-          <p:cNvPr id="6" name="Rectangle 5"/>
+      <p:cxnSp>
+        <p:nvCxnSpPr>
+          <p:cNvPr id="20" name="Straight Arrow Connector 19"/>
+          <p:cNvCxnSpPr>
+            <a:stCxn id="5" idx="1"/>
+            <a:endCxn id="16" idx="3"/>
+          </p:cNvCxnSpPr>
+          <p:nvPr/>
+        </p:nvCxnSpPr>
+        <p:spPr>
+          <a:xfrm flipH="1" flipV="1">
+            <a:off x="3429000" y="1654228"/>
+            <a:ext cx="1350818" cy="2"/>
+          </a:xfrm>
+          <a:prstGeom prst="straightConnector1">
+            <a:avLst/>
+          </a:prstGeom>
+          <a:ln>
+            <a:tailEnd type="triangle"/>
+          </a:ln>
+        </p:spPr>
+        <p:style>
+          <a:lnRef idx="1">
+            <a:schemeClr val="accent1"/>
+          </a:lnRef>
+          <a:fillRef idx="0">
+            <a:schemeClr val="accent1"/>
+          </a:fillRef>
+          <a:effectRef idx="0">
+            <a:schemeClr val="accent1"/>
+          </a:effectRef>
+          <a:fontRef idx="minor">
+            <a:schemeClr val="tx1"/>
+          </a:fontRef>
+        </p:style>
+      </p:cxnSp>
+      <p:cxnSp>
+        <p:nvCxnSpPr>
+          <p:cNvPr id="22" name="Straight Arrow Connector 21"/>
+          <p:cNvCxnSpPr>
+            <a:stCxn id="5" idx="2"/>
+            <a:endCxn id="18" idx="0"/>
+          </p:cNvCxnSpPr>
+          <p:nvPr/>
+        </p:nvCxnSpPr>
+        <p:spPr>
+          <a:xfrm flipH="1">
+            <a:off x="5594465" y="2036615"/>
+            <a:ext cx="1" cy="523702"/>
+          </a:xfrm>
+          <a:prstGeom prst="straightConnector1">
+            <a:avLst/>
+          </a:prstGeom>
+          <a:ln>
+            <a:tailEnd type="triangle"/>
+          </a:ln>
+        </p:spPr>
+        <p:style>
+          <a:lnRef idx="1">
+            <a:schemeClr val="accent1"/>
+          </a:lnRef>
+          <a:fillRef idx="0">
+            <a:schemeClr val="accent1"/>
+          </a:fillRef>
+          <a:effectRef idx="0">
+            <a:schemeClr val="accent1"/>
+          </a:effectRef>
+          <a:fontRef idx="minor">
+            <a:schemeClr val="tx1"/>
+          </a:fontRef>
+        </p:style>
+      </p:cxnSp>
+      <p:cxnSp>
+        <p:nvCxnSpPr>
+          <p:cNvPr id="30" name="Elbow Connector 29"/>
+          <p:cNvCxnSpPr>
+            <a:stCxn id="13" idx="0"/>
+            <a:endCxn id="18" idx="3"/>
+          </p:cNvCxnSpPr>
+          <p:nvPr/>
+        </p:nvCxnSpPr>
+        <p:spPr>
+          <a:xfrm rot="16200000" flipV="1">
+            <a:off x="7086601" y="2265215"/>
+            <a:ext cx="532015" cy="1886991"/>
+          </a:xfrm>
+          <a:prstGeom prst="bentConnector2">
+            <a:avLst/>
+          </a:prstGeom>
+          <a:ln>
+            <a:tailEnd type="triangle"/>
+          </a:ln>
+        </p:spPr>
+        <p:style>
+          <a:lnRef idx="1">
+            <a:schemeClr val="accent1"/>
+          </a:lnRef>
+          <a:fillRef idx="0">
+            <a:schemeClr val="accent1"/>
+          </a:fillRef>
+          <a:effectRef idx="0">
+            <a:schemeClr val="accent1"/>
+          </a:effectRef>
+          <a:fontRef idx="minor">
+            <a:schemeClr val="tx1"/>
+          </a:fontRef>
+        </p:style>
+      </p:cxnSp>
+      <p:sp>
+        <p:nvSpPr>
+          <p:cNvPr id="33" name="Rectangle 32"/>
           <p:cNvSpPr/>
           <p:nvPr/>
         </p:nvSpPr>
         <p:spPr>
           <a:xfrm>
-            <a:off x="160317" y="2846643"/>
-            <a:ext cx="1945179" cy="1338349"/>
+            <a:off x="4779819" y="4380806"/>
+            <a:ext cx="1629295" cy="764771"/>
           </a:xfrm>
           <a:prstGeom prst="rect">
             <a:avLst/>
@@ -3090,370 +3377,383 @@
             <a:pPr algn="ctr"/>
             <a:r>
               <a:rPr lang="en-US" dirty="0" smtClean="0"/>
-              <a:t>USER GROUP</a:t>
+              <a:t>Job Level</a:t>
             </a:r>
             <a:endParaRPr lang="en-US" dirty="0"/>
           </a:p>
         </p:txBody>
       </p:sp>
-      <p:sp>
-        <p:nvSpPr>
-          <p:cNvPr id="7" name="Rectangle 6"/>
+      <p:grpSp>
+        <p:nvGrpSpPr>
+          <p:cNvPr id="82" name="Group 81"/>
+          <p:cNvGrpSpPr/>
+          <p:nvPr/>
+        </p:nvGrpSpPr>
+        <p:grpSpPr>
+          <a:xfrm>
+            <a:off x="2614353" y="2036614"/>
+            <a:ext cx="8075814" cy="2726578"/>
+            <a:chOff x="2614353" y="2036614"/>
+            <a:chExt cx="8075814" cy="2726578"/>
+          </a:xfrm>
+        </p:grpSpPr>
+        <p:sp>
+          <p:nvSpPr>
+            <p:cNvPr id="13" name="Rectangle 12"/>
+            <p:cNvSpPr/>
+            <p:nvPr/>
+          </p:nvSpPr>
+          <p:spPr>
+            <a:xfrm>
+              <a:off x="7481455" y="3474718"/>
+              <a:ext cx="1629295" cy="764771"/>
+            </a:xfrm>
+            <a:prstGeom prst="rect">
+              <a:avLst/>
+            </a:prstGeom>
+          </p:spPr>
+          <p:style>
+            <a:lnRef idx="2">
+              <a:schemeClr val="accent1">
+                <a:shade val="50000"/>
+              </a:schemeClr>
+            </a:lnRef>
+            <a:fillRef idx="1">
+              <a:schemeClr val="accent1"/>
+            </a:fillRef>
+            <a:effectRef idx="0">
+              <a:schemeClr val="accent1"/>
+            </a:effectRef>
+            <a:fontRef idx="minor">
+              <a:schemeClr val="lt1"/>
+            </a:fontRef>
+          </p:style>
+          <p:txBody>
+            <a:bodyPr rtlCol="0" anchor="ctr"/>
+            <a:lstStyle/>
+            <a:p>
+              <a:pPr algn="ctr"/>
+              <a:r>
+                <a:rPr lang="en-US" dirty="0" smtClean="0"/>
+                <a:t>Wage</a:t>
+              </a:r>
+              <a:endParaRPr lang="en-US" dirty="0"/>
+            </a:p>
+          </p:txBody>
+        </p:sp>
+        <p:cxnSp>
+          <p:nvCxnSpPr>
+            <p:cNvPr id="35" name="Elbow Connector 34"/>
+            <p:cNvCxnSpPr>
+              <a:stCxn id="13" idx="2"/>
+              <a:endCxn id="33" idx="3"/>
+            </p:cNvCxnSpPr>
+            <p:nvPr/>
+          </p:nvCxnSpPr>
+          <p:spPr>
+            <a:xfrm rot="5400000">
+              <a:off x="7090758" y="3557846"/>
+              <a:ext cx="523703" cy="1886989"/>
+            </a:xfrm>
+            <a:prstGeom prst="bentConnector2">
+              <a:avLst/>
+            </a:prstGeom>
+            <a:ln>
+              <a:tailEnd type="triangle"/>
+            </a:ln>
+          </p:spPr>
+          <p:style>
+            <a:lnRef idx="1">
+              <a:schemeClr val="accent1"/>
+            </a:lnRef>
+            <a:fillRef idx="0">
+              <a:schemeClr val="accent1"/>
+            </a:fillRef>
+            <a:effectRef idx="0">
+              <a:schemeClr val="accent1"/>
+            </a:effectRef>
+            <a:fontRef idx="minor">
+              <a:schemeClr val="tx1"/>
+            </a:fontRef>
+          </p:style>
+        </p:cxnSp>
+        <p:cxnSp>
+          <p:nvCxnSpPr>
+            <p:cNvPr id="37" name="Elbow Connector 36"/>
+            <p:cNvCxnSpPr>
+              <a:stCxn id="13" idx="1"/>
+              <a:endCxn id="16" idx="2"/>
+            </p:cNvCxnSpPr>
+            <p:nvPr/>
+          </p:nvCxnSpPr>
+          <p:spPr>
+            <a:xfrm rot="10800000">
+              <a:off x="2614353" y="2036614"/>
+              <a:ext cx="4867102" cy="1820491"/>
+            </a:xfrm>
+            <a:prstGeom prst="bentConnector2">
+              <a:avLst/>
+            </a:prstGeom>
+            <a:ln>
+              <a:tailEnd type="triangle"/>
+            </a:ln>
+          </p:spPr>
+          <p:style>
+            <a:lnRef idx="1">
+              <a:schemeClr val="accent1"/>
+            </a:lnRef>
+            <a:fillRef idx="0">
+              <a:schemeClr val="accent1"/>
+            </a:fillRef>
+            <a:effectRef idx="0">
+              <a:schemeClr val="accent1"/>
+            </a:effectRef>
+            <a:fontRef idx="minor">
+              <a:schemeClr val="tx1"/>
+            </a:fontRef>
+          </p:style>
+        </p:cxnSp>
+        <p:cxnSp>
+          <p:nvCxnSpPr>
+            <p:cNvPr id="39" name="Elbow Connector 38"/>
+            <p:cNvCxnSpPr>
+              <a:stCxn id="13" idx="0"/>
+              <a:endCxn id="6" idx="2"/>
+            </p:cNvCxnSpPr>
+            <p:nvPr/>
+          </p:nvCxnSpPr>
+          <p:spPr>
+            <a:xfrm rot="5400000" flipH="1" flipV="1">
+              <a:off x="8774083" y="1558634"/>
+              <a:ext cx="1438104" cy="2394064"/>
+            </a:xfrm>
+            <a:prstGeom prst="bentConnector3">
+              <a:avLst>
+                <a:gd name="adj1" fmla="val 36705"/>
+              </a:avLst>
+            </a:prstGeom>
+            <a:ln>
+              <a:tailEnd type="triangle"/>
+            </a:ln>
+          </p:spPr>
+          <p:style>
+            <a:lnRef idx="1">
+              <a:schemeClr val="accent1"/>
+            </a:lnRef>
+            <a:fillRef idx="0">
+              <a:schemeClr val="accent1"/>
+            </a:fillRef>
+            <a:effectRef idx="0">
+              <a:schemeClr val="accent1"/>
+            </a:effectRef>
+            <a:fontRef idx="minor">
+              <a:schemeClr val="tx1"/>
+            </a:fontRef>
+          </p:style>
+        </p:cxnSp>
+      </p:grpSp>
+      <p:grpSp>
+        <p:nvGrpSpPr>
+          <p:cNvPr id="79" name="Group 78"/>
+          <p:cNvGrpSpPr/>
+          <p:nvPr/>
+        </p:nvGrpSpPr>
+        <p:grpSpPr>
+          <a:xfrm>
+            <a:off x="1799706" y="4380805"/>
+            <a:ext cx="2980113" cy="764771"/>
+            <a:chOff x="1799706" y="4380805"/>
+            <a:chExt cx="2980113" cy="764771"/>
+          </a:xfrm>
+        </p:grpSpPr>
+        <p:sp>
+          <p:nvSpPr>
+            <p:cNvPr id="44" name="Rectangle 43"/>
+            <p:cNvSpPr/>
+            <p:nvPr/>
+          </p:nvSpPr>
+          <p:spPr>
+            <a:xfrm>
+              <a:off x="1799706" y="4380805"/>
+              <a:ext cx="1629295" cy="764771"/>
+            </a:xfrm>
+            <a:prstGeom prst="rect">
+              <a:avLst/>
+            </a:prstGeom>
+          </p:spPr>
+          <p:style>
+            <a:lnRef idx="2">
+              <a:schemeClr val="accent1">
+                <a:shade val="50000"/>
+              </a:schemeClr>
+            </a:lnRef>
+            <a:fillRef idx="1">
+              <a:schemeClr val="accent1"/>
+            </a:fillRef>
+            <a:effectRef idx="0">
+              <a:schemeClr val="accent1"/>
+            </a:effectRef>
+            <a:fontRef idx="minor">
+              <a:schemeClr val="lt1"/>
+            </a:fontRef>
+          </p:style>
+          <p:txBody>
+            <a:bodyPr rtlCol="0" anchor="ctr"/>
+            <a:lstStyle/>
+            <a:p>
+              <a:pPr algn="ctr"/>
+              <a:r>
+                <a:rPr lang="en-US" dirty="0" smtClean="0"/>
+                <a:t>Staff Job Level</a:t>
+              </a:r>
+              <a:endParaRPr lang="en-US" dirty="0"/>
+            </a:p>
+          </p:txBody>
+        </p:sp>
+        <p:cxnSp>
+          <p:nvCxnSpPr>
+            <p:cNvPr id="46" name="Straight Arrow Connector 45"/>
+            <p:cNvCxnSpPr>
+              <a:stCxn id="44" idx="3"/>
+              <a:endCxn id="33" idx="1"/>
+            </p:cNvCxnSpPr>
+            <p:nvPr/>
+          </p:nvCxnSpPr>
+          <p:spPr>
+            <a:xfrm>
+              <a:off x="3429001" y="4763191"/>
+              <a:ext cx="1350818" cy="1"/>
+            </a:xfrm>
+            <a:prstGeom prst="straightConnector1">
+              <a:avLst/>
+            </a:prstGeom>
+            <a:ln>
+              <a:tailEnd type="triangle"/>
+            </a:ln>
+          </p:spPr>
+          <p:style>
+            <a:lnRef idx="1">
+              <a:schemeClr val="accent1"/>
+            </a:lnRef>
+            <a:fillRef idx="0">
+              <a:schemeClr val="accent1"/>
+            </a:fillRef>
+            <a:effectRef idx="0">
+              <a:schemeClr val="accent1"/>
+            </a:effectRef>
+            <a:fontRef idx="minor">
+              <a:schemeClr val="tx1"/>
+            </a:fontRef>
+          </p:style>
+        </p:cxnSp>
+      </p:grpSp>
+      <p:grpSp>
+        <p:nvGrpSpPr>
+          <p:cNvPr id="80" name="Group 79"/>
+          <p:cNvGrpSpPr/>
+          <p:nvPr/>
+        </p:nvGrpSpPr>
+        <p:grpSpPr>
+          <a:xfrm>
+            <a:off x="1799705" y="1271842"/>
+            <a:ext cx="1629295" cy="3491350"/>
+            <a:chOff x="1799705" y="1271842"/>
+            <a:chExt cx="1629295" cy="3491350"/>
+          </a:xfrm>
+        </p:grpSpPr>
+        <p:sp>
+          <p:nvSpPr>
+            <p:cNvPr id="16" name="Rectangle 15"/>
+            <p:cNvSpPr/>
+            <p:nvPr/>
+          </p:nvSpPr>
+          <p:spPr>
+            <a:xfrm>
+              <a:off x="1799705" y="1271842"/>
+              <a:ext cx="1629295" cy="764771"/>
+            </a:xfrm>
+            <a:prstGeom prst="rect">
+              <a:avLst/>
+            </a:prstGeom>
+          </p:spPr>
+          <p:style>
+            <a:lnRef idx="2">
+              <a:schemeClr val="accent1">
+                <a:shade val="50000"/>
+              </a:schemeClr>
+            </a:lnRef>
+            <a:fillRef idx="1">
+              <a:schemeClr val="accent1"/>
+            </a:fillRef>
+            <a:effectRef idx="0">
+              <a:schemeClr val="accent1"/>
+            </a:effectRef>
+            <a:fontRef idx="minor">
+              <a:schemeClr val="lt1"/>
+            </a:fontRef>
+          </p:style>
+          <p:txBody>
+            <a:bodyPr rtlCol="0" anchor="ctr"/>
+            <a:lstStyle/>
+            <a:p>
+              <a:pPr algn="ctr"/>
+              <a:r>
+                <a:rPr lang="en-US" dirty="0" smtClean="0"/>
+                <a:t>Staff Level</a:t>
+              </a:r>
+              <a:endParaRPr lang="en-US" dirty="0"/>
+            </a:p>
+          </p:txBody>
+        </p:sp>
+        <p:cxnSp>
+          <p:nvCxnSpPr>
+            <p:cNvPr id="48" name="Elbow Connector 47"/>
+            <p:cNvCxnSpPr>
+              <a:stCxn id="44" idx="1"/>
+              <a:endCxn id="16" idx="1"/>
+            </p:cNvCxnSpPr>
+            <p:nvPr/>
+          </p:nvCxnSpPr>
+          <p:spPr>
+            <a:xfrm rot="10800000">
+              <a:off x="1799706" y="1654229"/>
+              <a:ext cx="1" cy="3108963"/>
+            </a:xfrm>
+            <a:prstGeom prst="bentConnector3">
+              <a:avLst>
+                <a:gd name="adj1" fmla="val 22860100000"/>
+              </a:avLst>
+            </a:prstGeom>
+            <a:ln>
+              <a:tailEnd type="triangle"/>
+            </a:ln>
+          </p:spPr>
+          <p:style>
+            <a:lnRef idx="1">
+              <a:schemeClr val="accent1"/>
+            </a:lnRef>
+            <a:fillRef idx="0">
+              <a:schemeClr val="accent1"/>
+            </a:fillRef>
+            <a:effectRef idx="0">
+              <a:schemeClr val="accent1"/>
+            </a:effectRef>
+            <a:fontRef idx="minor">
+              <a:schemeClr val="tx1"/>
+            </a:fontRef>
+          </p:style>
+        </p:cxnSp>
+      </p:grpSp>
+      <p:sp>
+        <p:nvSpPr>
+          <p:cNvPr id="59" name="Oval 58"/>
           <p:cNvSpPr/>
           <p:nvPr/>
         </p:nvSpPr>
         <p:spPr>
           <a:xfrm>
-            <a:off x="5804658" y="2846643"/>
-            <a:ext cx="1945179" cy="1338349"/>
-          </a:xfrm>
-          <a:prstGeom prst="rect">
-            <a:avLst/>
-          </a:prstGeom>
-        </p:spPr>
-        <p:style>
-          <a:lnRef idx="2">
-            <a:schemeClr val="accent1">
-              <a:shade val="50000"/>
-            </a:schemeClr>
-          </a:lnRef>
-          <a:fillRef idx="1">
-            <a:schemeClr val="accent1"/>
-          </a:fillRef>
-          <a:effectRef idx="0">
-            <a:schemeClr val="accent1"/>
-          </a:effectRef>
-          <a:fontRef idx="minor">
-            <a:schemeClr val="lt1"/>
-          </a:fontRef>
-        </p:style>
-        <p:txBody>
-          <a:bodyPr rtlCol="0" anchor="ctr"/>
-          <a:lstStyle/>
-          <a:p>
-            <a:pPr algn="ctr"/>
-            <a:r>
-              <a:rPr lang="en-US" dirty="0" smtClean="0"/>
-              <a:t>STAFF LEVEL</a:t>
-            </a:r>
-            <a:endParaRPr lang="en-US" dirty="0"/>
-          </a:p>
-        </p:txBody>
-      </p:sp>
-      <p:sp>
-        <p:nvSpPr>
-          <p:cNvPr id="8" name="Rectangle 7"/>
-          <p:cNvSpPr/>
-          <p:nvPr/>
-        </p:nvSpPr>
-        <p:spPr>
-          <a:xfrm>
-            <a:off x="2860594" y="1440902"/>
-            <a:ext cx="1945179" cy="1338349"/>
-          </a:xfrm>
-          <a:prstGeom prst="rect">
-            <a:avLst/>
-          </a:prstGeom>
-        </p:spPr>
-        <p:style>
-          <a:lnRef idx="2">
-            <a:schemeClr val="accent1">
-              <a:shade val="50000"/>
-            </a:schemeClr>
-          </a:lnRef>
-          <a:fillRef idx="1">
-            <a:schemeClr val="accent1"/>
-          </a:fillRef>
-          <a:effectRef idx="0">
-            <a:schemeClr val="accent1"/>
-          </a:effectRef>
-          <a:fontRef idx="minor">
-            <a:schemeClr val="lt1"/>
-          </a:fontRef>
-        </p:style>
-        <p:txBody>
-          <a:bodyPr rtlCol="0" anchor="ctr"/>
-          <a:lstStyle/>
-          <a:p>
-            <a:pPr algn="ctr"/>
-            <a:r>
-              <a:rPr lang="en-US" dirty="0" smtClean="0"/>
-              <a:t>WAGE</a:t>
-            </a:r>
-            <a:endParaRPr lang="en-US" dirty="0"/>
-          </a:p>
-        </p:txBody>
-      </p:sp>
-      <p:cxnSp>
-        <p:nvCxnSpPr>
-          <p:cNvPr id="10" name="Straight Arrow Connector 9"/>
-          <p:cNvCxnSpPr>
-            <a:stCxn id="8" idx="1"/>
-            <a:endCxn id="4" idx="3"/>
-          </p:cNvCxnSpPr>
-          <p:nvPr/>
-        </p:nvCxnSpPr>
-        <p:spPr>
-          <a:xfrm flipH="1" flipV="1">
-            <a:off x="2105495" y="919703"/>
-            <a:ext cx="755099" cy="1190374"/>
-          </a:xfrm>
-          <a:prstGeom prst="straightConnector1">
-            <a:avLst/>
-          </a:prstGeom>
-          <a:ln w="25400">
-            <a:tailEnd type="triangle"/>
-          </a:ln>
-        </p:spPr>
-        <p:style>
-          <a:lnRef idx="1">
-            <a:schemeClr val="accent1"/>
-          </a:lnRef>
-          <a:fillRef idx="0">
-            <a:schemeClr val="accent1"/>
-          </a:fillRef>
-          <a:effectRef idx="0">
-            <a:schemeClr val="accent1"/>
-          </a:effectRef>
-          <a:fontRef idx="minor">
-            <a:schemeClr val="tx1"/>
-          </a:fontRef>
-        </p:style>
-      </p:cxnSp>
-      <p:cxnSp>
-        <p:nvCxnSpPr>
-          <p:cNvPr id="11" name="Straight Arrow Connector 10"/>
-          <p:cNvCxnSpPr>
-            <a:stCxn id="8" idx="1"/>
-            <a:endCxn id="6" idx="3"/>
-          </p:cNvCxnSpPr>
-          <p:nvPr/>
-        </p:nvCxnSpPr>
-        <p:spPr>
-          <a:xfrm flipH="1">
-            <a:off x="2105496" y="2110077"/>
-            <a:ext cx="755098" cy="1405741"/>
-          </a:xfrm>
-          <a:prstGeom prst="straightConnector1">
-            <a:avLst/>
-          </a:prstGeom>
-          <a:ln w="25400">
-            <a:tailEnd type="triangle"/>
-          </a:ln>
-        </p:spPr>
-        <p:style>
-          <a:lnRef idx="1">
-            <a:schemeClr val="accent1"/>
-          </a:lnRef>
-          <a:fillRef idx="0">
-            <a:schemeClr val="accent1"/>
-          </a:fillRef>
-          <a:effectRef idx="0">
-            <a:schemeClr val="accent1"/>
-          </a:effectRef>
-          <a:fontRef idx="minor">
-            <a:schemeClr val="tx1"/>
-          </a:fontRef>
-        </p:style>
-      </p:cxnSp>
-      <p:cxnSp>
-        <p:nvCxnSpPr>
-          <p:cNvPr id="12" name="Straight Arrow Connector 11"/>
-          <p:cNvCxnSpPr>
-            <a:stCxn id="8" idx="3"/>
-            <a:endCxn id="7" idx="1"/>
-          </p:cNvCxnSpPr>
-          <p:nvPr/>
-        </p:nvCxnSpPr>
-        <p:spPr>
-          <a:xfrm>
-            <a:off x="4805773" y="2110077"/>
-            <a:ext cx="998885" cy="1405741"/>
-          </a:xfrm>
-          <a:prstGeom prst="straightConnector1">
-            <a:avLst/>
-          </a:prstGeom>
-          <a:ln w="25400">
-            <a:tailEnd type="triangle"/>
-          </a:ln>
-        </p:spPr>
-        <p:style>
-          <a:lnRef idx="1">
-            <a:schemeClr val="accent1"/>
-          </a:lnRef>
-          <a:fillRef idx="0">
-            <a:schemeClr val="accent1"/>
-          </a:fillRef>
-          <a:effectRef idx="0">
-            <a:schemeClr val="accent1"/>
-          </a:effectRef>
-          <a:fontRef idx="minor">
-            <a:schemeClr val="tx1"/>
-          </a:fontRef>
-        </p:style>
-      </p:cxnSp>
-      <p:cxnSp>
-        <p:nvCxnSpPr>
-          <p:cNvPr id="13" name="Straight Arrow Connector 12"/>
-          <p:cNvCxnSpPr>
-            <a:stCxn id="8" idx="3"/>
-            <a:endCxn id="5" idx="1"/>
-          </p:cNvCxnSpPr>
-          <p:nvPr/>
-        </p:nvCxnSpPr>
-        <p:spPr>
-          <a:xfrm flipV="1">
-            <a:off x="4805773" y="919703"/>
-            <a:ext cx="1082861" cy="1190374"/>
-          </a:xfrm>
-          <a:prstGeom prst="straightConnector1">
-            <a:avLst/>
-          </a:prstGeom>
-          <a:ln w="25400">
-            <a:tailEnd type="triangle"/>
-          </a:ln>
-        </p:spPr>
-        <p:style>
-          <a:lnRef idx="1">
-            <a:schemeClr val="accent1"/>
-          </a:lnRef>
-          <a:fillRef idx="0">
-            <a:schemeClr val="accent1"/>
-          </a:fillRef>
-          <a:effectRef idx="0">
-            <a:schemeClr val="accent1"/>
-          </a:effectRef>
-          <a:fontRef idx="minor">
-            <a:schemeClr val="tx1"/>
-          </a:fontRef>
-        </p:style>
-      </p:cxnSp>
-      <p:sp>
-        <p:nvSpPr>
-          <p:cNvPr id="39" name="Rectangle 38"/>
-          <p:cNvSpPr/>
-          <p:nvPr/>
-        </p:nvSpPr>
-        <p:spPr>
-          <a:xfrm>
-            <a:off x="2860593" y="4474241"/>
-            <a:ext cx="1945179" cy="1338349"/>
-          </a:xfrm>
-          <a:prstGeom prst="rect">
-            <a:avLst/>
-          </a:prstGeom>
-        </p:spPr>
-        <p:style>
-          <a:lnRef idx="2">
-            <a:schemeClr val="accent1">
-              <a:shade val="50000"/>
-            </a:schemeClr>
-          </a:lnRef>
-          <a:fillRef idx="1">
-            <a:schemeClr val="accent1"/>
-          </a:fillRef>
-          <a:effectRef idx="0">
-            <a:schemeClr val="accent1"/>
-          </a:effectRef>
-          <a:fontRef idx="minor">
-            <a:schemeClr val="lt1"/>
-          </a:fontRef>
-        </p:style>
-        <p:txBody>
-          <a:bodyPr rtlCol="0" anchor="ctr"/>
-          <a:lstStyle/>
-          <a:p>
-            <a:pPr algn="ctr"/>
-            <a:r>
-              <a:rPr lang="en-US" dirty="0" smtClean="0"/>
-              <a:t>USER</a:t>
-            </a:r>
-            <a:endParaRPr lang="en-US" dirty="0"/>
-          </a:p>
-        </p:txBody>
-      </p:sp>
-      <p:cxnSp>
-        <p:nvCxnSpPr>
-          <p:cNvPr id="41" name="Straight Arrow Connector 40"/>
-          <p:cNvCxnSpPr>
-            <a:stCxn id="39" idx="3"/>
-            <a:endCxn id="7" idx="1"/>
-          </p:cNvCxnSpPr>
-          <p:nvPr/>
-        </p:nvCxnSpPr>
-        <p:spPr>
-          <a:xfrm flipV="1">
-            <a:off x="4805772" y="3515818"/>
-            <a:ext cx="998886" cy="1627598"/>
-          </a:xfrm>
-          <a:prstGeom prst="straightConnector1">
-            <a:avLst/>
-          </a:prstGeom>
-          <a:ln w="25400">
-            <a:tailEnd type="triangle"/>
-          </a:ln>
-        </p:spPr>
-        <p:style>
-          <a:lnRef idx="1">
-            <a:schemeClr val="accent1"/>
-          </a:lnRef>
-          <a:fillRef idx="0">
-            <a:schemeClr val="accent1"/>
-          </a:fillRef>
-          <a:effectRef idx="0">
-            <a:schemeClr val="accent1"/>
-          </a:effectRef>
-          <a:fontRef idx="minor">
-            <a:schemeClr val="tx1"/>
-          </a:fontRef>
-        </p:style>
-      </p:cxnSp>
-      <p:cxnSp>
-        <p:nvCxnSpPr>
-          <p:cNvPr id="44" name="Straight Arrow Connector 43"/>
-          <p:cNvCxnSpPr>
-            <a:stCxn id="39" idx="1"/>
-            <a:endCxn id="6" idx="3"/>
-          </p:cNvCxnSpPr>
-          <p:nvPr/>
-        </p:nvCxnSpPr>
-        <p:spPr>
-          <a:xfrm flipH="1" flipV="1">
-            <a:off x="2105496" y="3515818"/>
-            <a:ext cx="755097" cy="1627598"/>
-          </a:xfrm>
-          <a:prstGeom prst="straightConnector1">
-            <a:avLst/>
-          </a:prstGeom>
-          <a:ln w="25400">
-            <a:tailEnd type="triangle"/>
-          </a:ln>
-        </p:spPr>
-        <p:style>
-          <a:lnRef idx="1">
-            <a:schemeClr val="accent1"/>
-          </a:lnRef>
-          <a:fillRef idx="0">
-            <a:schemeClr val="accent1"/>
-          </a:fillRef>
-          <a:effectRef idx="0">
-            <a:schemeClr val="accent1"/>
-          </a:effectRef>
-          <a:fontRef idx="minor">
-            <a:schemeClr val="tx1"/>
-          </a:fontRef>
-        </p:style>
-      </p:cxnSp>
-      <p:sp>
-        <p:nvSpPr>
-          <p:cNvPr id="73" name="Oval 72"/>
-          <p:cNvSpPr/>
-          <p:nvPr/>
-        </p:nvSpPr>
-        <p:spPr>
-          <a:xfrm>
-            <a:off x="8762038" y="476498"/>
-            <a:ext cx="1819470" cy="886408"/>
+            <a:off x="5000105" y="5968536"/>
+            <a:ext cx="1188720" cy="598519"/>
           </a:xfrm>
           <a:prstGeom prst="ellipse">
             <a:avLst/>
@@ -3482,12 +3782,48 @@
             <a:pPr algn="ctr"/>
             <a:r>
               <a:rPr lang="en-US" dirty="0" smtClean="0"/>
-              <a:t>BEGIN</a:t>
+              <a:t>Begin</a:t>
             </a:r>
             <a:endParaRPr lang="en-US" dirty="0"/>
           </a:p>
         </p:txBody>
       </p:sp>
+      <p:cxnSp>
+        <p:nvCxnSpPr>
+          <p:cNvPr id="67" name="Straight Arrow Connector 66"/>
+          <p:cNvCxnSpPr>
+            <a:stCxn id="59" idx="0"/>
+            <a:endCxn id="33" idx="2"/>
+          </p:cNvCxnSpPr>
+          <p:nvPr/>
+        </p:nvCxnSpPr>
+        <p:spPr>
+          <a:xfrm flipV="1">
+            <a:off x="5594465" y="5145577"/>
+            <a:ext cx="2" cy="822959"/>
+          </a:xfrm>
+          <a:prstGeom prst="straightConnector1">
+            <a:avLst/>
+          </a:prstGeom>
+          <a:ln>
+            <a:tailEnd type="triangle"/>
+          </a:ln>
+        </p:spPr>
+        <p:style>
+          <a:lnRef idx="1">
+            <a:schemeClr val="accent1"/>
+          </a:lnRef>
+          <a:fillRef idx="0">
+            <a:schemeClr val="accent1"/>
+          </a:fillRef>
+          <a:effectRef idx="0">
+            <a:schemeClr val="accent1"/>
+          </a:effectRef>
+          <a:fontRef idx="minor">
+            <a:schemeClr val="tx1"/>
+          </a:fontRef>
+        </p:style>
+      </p:cxnSp>
       <p:sp>
         <p:nvSpPr>
           <p:cNvPr id="74" name="Oval 73"/>
@@ -3496,8 +3832,8 @@
         </p:nvSpPr>
         <p:spPr>
           <a:xfrm>
-            <a:off x="6139543" y="4700211"/>
-            <a:ext cx="1819470" cy="886408"/>
+            <a:off x="5000104" y="112214"/>
+            <a:ext cx="1188720" cy="598519"/>
           </a:xfrm>
           <a:prstGeom prst="ellipse">
             <a:avLst/>
@@ -3526,7 +3862,7 @@
             <a:pPr algn="ctr"/>
             <a:r>
               <a:rPr lang="en-US" dirty="0" smtClean="0"/>
-              <a:t>END</a:t>
+              <a:t>End</a:t>
             </a:r>
             <a:endParaRPr lang="en-US" dirty="0"/>
           </a:p>
@@ -3534,22 +3870,22 @@
       </p:sp>
       <p:cxnSp>
         <p:nvCxnSpPr>
-          <p:cNvPr id="75" name="Straight Arrow Connector 74"/>
+          <p:cNvPr id="76" name="Straight Arrow Connector 75"/>
           <p:cNvCxnSpPr>
-            <a:stCxn id="73" idx="2"/>
-            <a:endCxn id="5" idx="3"/>
+            <a:stCxn id="5" idx="0"/>
+            <a:endCxn id="74" idx="4"/>
           </p:cNvCxnSpPr>
           <p:nvPr/>
         </p:nvCxnSpPr>
         <p:spPr>
-          <a:xfrm flipH="1">
-            <a:off x="7833813" y="919702"/>
-            <a:ext cx="928225" cy="1"/>
+          <a:xfrm flipH="1" flipV="1">
+            <a:off x="5594464" y="710733"/>
+            <a:ext cx="2" cy="561111"/>
           </a:xfrm>
           <a:prstGeom prst="straightConnector1">
             <a:avLst/>
           </a:prstGeom>
-          <a:ln w="25400">
+          <a:ln>
             <a:tailEnd type="triangle"/>
           </a:ln>
         </p:spPr>
@@ -3568,52 +3904,16 @@
           </a:fontRef>
         </p:style>
       </p:cxnSp>
-      <p:cxnSp>
-        <p:nvCxnSpPr>
-          <p:cNvPr id="79" name="Straight Arrow Connector 78"/>
-          <p:cNvCxnSpPr>
-            <a:stCxn id="39" idx="3"/>
-            <a:endCxn id="74" idx="2"/>
-          </p:cNvCxnSpPr>
-          <p:nvPr/>
-        </p:nvCxnSpPr>
-        <p:spPr>
-          <a:xfrm flipV="1">
-            <a:off x="4805772" y="5143415"/>
-            <a:ext cx="1333771" cy="1"/>
-          </a:xfrm>
-          <a:prstGeom prst="straightConnector1">
-            <a:avLst/>
-          </a:prstGeom>
-          <a:ln w="25400">
-            <a:tailEnd type="triangle"/>
-          </a:ln>
-        </p:spPr>
-        <p:style>
-          <a:lnRef idx="1">
-            <a:schemeClr val="accent1"/>
-          </a:lnRef>
-          <a:fillRef idx="0">
-            <a:schemeClr val="accent1"/>
-          </a:fillRef>
-          <a:effectRef idx="0">
-            <a:schemeClr val="accent1"/>
-          </a:effectRef>
-          <a:fontRef idx="minor">
-            <a:schemeClr val="tx1"/>
-          </a:fontRef>
-        </p:style>
-      </p:cxnSp>
-      <p:sp>
-        <p:nvSpPr>
-          <p:cNvPr id="82" name="TextBox 81"/>
+      <p:sp>
+        <p:nvSpPr>
+          <p:cNvPr id="78" name="TextBox 77"/>
           <p:cNvSpPr txBox="1"/>
           <p:nvPr/>
         </p:nvSpPr>
         <p:spPr>
           <a:xfrm>
-            <a:off x="7959013" y="1786910"/>
-            <a:ext cx="3620279" cy="646331"/>
+            <a:off x="9667702" y="3749040"/>
+            <a:ext cx="1953491" cy="523220"/>
           </a:xfrm>
           <a:prstGeom prst="rect">
             <a:avLst/>
@@ -3627,42 +3927,36 @@
           <a:lstStyle/>
           <a:p>
             <a:r>
-              <a:rPr lang="en-US" dirty="0" smtClean="0">
-                <a:solidFill>
-                  <a:srgbClr val="FF0000"/>
-                </a:solidFill>
+              <a:rPr lang="en-US" sz="1400" b="1" dirty="0" smtClean="0">
                 <a:latin typeface="Times New Roman" panose="02020603050405020304" pitchFamily="18" charset="0"/>
                 <a:cs typeface="Times New Roman" panose="02020603050405020304" pitchFamily="18" charset="0"/>
               </a:rPr>
-              <a:t>INPUT</a:t>
-            </a:r>
-            <a:r>
-              <a:rPr lang="en-US" dirty="0" smtClean="0">
+              <a:t>Input:</a:t>
+            </a:r>
+            <a:r>
+              <a:rPr lang="en-US" sz="1400" dirty="0" smtClean="0">
                 <a:latin typeface="Times New Roman" panose="02020603050405020304" pitchFamily="18" charset="0"/>
                 <a:cs typeface="Times New Roman" panose="02020603050405020304" pitchFamily="18" charset="0"/>
               </a:rPr>
-              <a:t>: 		JOB LEVEL ID</a:t>
-            </a:r>
-          </a:p>
-          <a:p>
-            <a:r>
-              <a:rPr lang="en-US" dirty="0" smtClean="0">
-                <a:solidFill>
-                  <a:srgbClr val="FF0000"/>
-                </a:solidFill>
+              <a:t> Job level</a:t>
+            </a:r>
+          </a:p>
+          <a:p>
+            <a:r>
+              <a:rPr lang="en-US" sz="1400" b="1" dirty="0" smtClean="0">
                 <a:latin typeface="Times New Roman" panose="02020603050405020304" pitchFamily="18" charset="0"/>
                 <a:cs typeface="Times New Roman" panose="02020603050405020304" pitchFamily="18" charset="0"/>
               </a:rPr>
-              <a:t>OUTPUT</a:t>
-            </a:r>
-            <a:r>
-              <a:rPr lang="en-US" dirty="0" smtClean="0">
+              <a:t>Output:</a:t>
+            </a:r>
+            <a:r>
+              <a:rPr lang="en-US" sz="1400" dirty="0" smtClean="0">
                 <a:latin typeface="Times New Roman" panose="02020603050405020304" pitchFamily="18" charset="0"/>
                 <a:cs typeface="Times New Roman" panose="02020603050405020304" pitchFamily="18" charset="0"/>
               </a:rPr>
-              <a:t>: 	EDITORS</a:t>
-            </a:r>
-            <a:endParaRPr lang="en-US" dirty="0">
+              <a:t> Editors</a:t>
+            </a:r>
+            <a:endParaRPr lang="en-US" sz="1400" dirty="0">
               <a:latin typeface="Times New Roman" panose="02020603050405020304" pitchFamily="18" charset="0"/>
               <a:cs typeface="Times New Roman" panose="02020603050405020304" pitchFamily="18" charset="0"/>
             </a:endParaRPr>
@@ -3672,13 +3966,544 @@
     </p:spTree>
     <p:extLst>
       <p:ext uri="{BB962C8B-B14F-4D97-AF65-F5344CB8AC3E}">
-        <p14:creationId xmlns:p14="http://schemas.microsoft.com/office/powerpoint/2010/main" val="816137234"/>
+        <p14:creationId xmlns:p14="http://schemas.microsoft.com/office/powerpoint/2010/main" val="1459612137"/>
       </p:ext>
     </p:extLst>
   </p:cSld>
   <p:clrMapOvr>
     <a:masterClrMapping/>
   </p:clrMapOvr>
+  <p:timing>
+    <p:tnLst>
+      <p:par>
+        <p:cTn id="1" dur="indefinite" restart="never" nodeType="tmRoot">
+          <p:childTnLst>
+            <p:seq concurrent="1" nextAc="seek">
+              <p:cTn id="2" dur="indefinite" nodeType="mainSeq">
+                <p:childTnLst>
+                  <p:par>
+                    <p:cTn id="3" fill="hold">
+                      <p:stCondLst>
+                        <p:cond delay="indefinite"/>
+                      </p:stCondLst>
+                      <p:childTnLst>
+                        <p:par>
+                          <p:cTn id="4" fill="hold">
+                            <p:stCondLst>
+                              <p:cond delay="0"/>
+                            </p:stCondLst>
+                            <p:childTnLst>
+                              <p:par>
+                                <p:cTn id="5" presetID="1" presetClass="entr" presetSubtype="0" fill="hold" grpId="0" nodeType="clickEffect">
+                                  <p:stCondLst>
+                                    <p:cond delay="0"/>
+                                  </p:stCondLst>
+                                  <p:childTnLst>
+                                    <p:set>
+                                      <p:cBhvr>
+                                        <p:cTn id="6" dur="1" fill="hold">
+                                          <p:stCondLst>
+                                            <p:cond delay="0"/>
+                                          </p:stCondLst>
+                                        </p:cTn>
+                                        <p:tgtEl>
+                                          <p:spTgt spid="33"/>
+                                        </p:tgtEl>
+                                        <p:attrNameLst>
+                                          <p:attrName>style.visibility</p:attrName>
+                                        </p:attrNameLst>
+                                      </p:cBhvr>
+                                      <p:to>
+                                        <p:strVal val="visible"/>
+                                      </p:to>
+                                    </p:set>
+                                  </p:childTnLst>
+                                </p:cTn>
+                              </p:par>
+                            </p:childTnLst>
+                          </p:cTn>
+                        </p:par>
+                      </p:childTnLst>
+                    </p:cTn>
+                  </p:par>
+                  <p:par>
+                    <p:cTn id="7" fill="hold">
+                      <p:stCondLst>
+                        <p:cond delay="indefinite"/>
+                      </p:stCondLst>
+                      <p:childTnLst>
+                        <p:par>
+                          <p:cTn id="8" fill="hold">
+                            <p:stCondLst>
+                              <p:cond delay="0"/>
+                            </p:stCondLst>
+                            <p:childTnLst>
+                              <p:par>
+                                <p:cTn id="9" presetID="1" presetClass="entr" presetSubtype="0" fill="hold" nodeType="clickEffect">
+                                  <p:stCondLst>
+                                    <p:cond delay="0"/>
+                                  </p:stCondLst>
+                                  <p:childTnLst>
+                                    <p:set>
+                                      <p:cBhvr>
+                                        <p:cTn id="10" dur="1" fill="hold">
+                                          <p:stCondLst>
+                                            <p:cond delay="0"/>
+                                          </p:stCondLst>
+                                        </p:cTn>
+                                        <p:tgtEl>
+                                          <p:spTgt spid="79"/>
+                                        </p:tgtEl>
+                                        <p:attrNameLst>
+                                          <p:attrName>style.visibility</p:attrName>
+                                        </p:attrNameLst>
+                                      </p:cBhvr>
+                                      <p:to>
+                                        <p:strVal val="visible"/>
+                                      </p:to>
+                                    </p:set>
+                                  </p:childTnLst>
+                                </p:cTn>
+                              </p:par>
+                            </p:childTnLst>
+                          </p:cTn>
+                        </p:par>
+                      </p:childTnLst>
+                    </p:cTn>
+                  </p:par>
+                  <p:par>
+                    <p:cTn id="11" fill="hold">
+                      <p:stCondLst>
+                        <p:cond delay="indefinite"/>
+                      </p:stCondLst>
+                      <p:childTnLst>
+                        <p:par>
+                          <p:cTn id="12" fill="hold">
+                            <p:stCondLst>
+                              <p:cond delay="0"/>
+                            </p:stCondLst>
+                            <p:childTnLst>
+                              <p:par>
+                                <p:cTn id="13" presetID="1" presetClass="entr" presetSubtype="0" fill="hold" nodeType="clickEffect">
+                                  <p:stCondLst>
+                                    <p:cond delay="0"/>
+                                  </p:stCondLst>
+                                  <p:childTnLst>
+                                    <p:set>
+                                      <p:cBhvr>
+                                        <p:cTn id="14" dur="1" fill="hold">
+                                          <p:stCondLst>
+                                            <p:cond delay="0"/>
+                                          </p:stCondLst>
+                                        </p:cTn>
+                                        <p:tgtEl>
+                                          <p:spTgt spid="80"/>
+                                        </p:tgtEl>
+                                        <p:attrNameLst>
+                                          <p:attrName>style.visibility</p:attrName>
+                                        </p:attrNameLst>
+                                      </p:cBhvr>
+                                      <p:to>
+                                        <p:strVal val="visible"/>
+                                      </p:to>
+                                    </p:set>
+                                  </p:childTnLst>
+                                </p:cTn>
+                              </p:par>
+                            </p:childTnLst>
+                          </p:cTn>
+                        </p:par>
+                      </p:childTnLst>
+                    </p:cTn>
+                  </p:par>
+                  <p:par>
+                    <p:cTn id="15" fill="hold">
+                      <p:stCondLst>
+                        <p:cond delay="indefinite"/>
+                      </p:stCondLst>
+                      <p:childTnLst>
+                        <p:par>
+                          <p:cTn id="16" fill="hold">
+                            <p:stCondLst>
+                              <p:cond delay="0"/>
+                            </p:stCondLst>
+                            <p:childTnLst>
+                              <p:par>
+                                <p:cTn id="17" presetID="1" presetClass="entr" presetSubtype="0" fill="hold" nodeType="clickEffect">
+                                  <p:stCondLst>
+                                    <p:cond delay="0"/>
+                                  </p:stCondLst>
+                                  <p:childTnLst>
+                                    <p:set>
+                                      <p:cBhvr>
+                                        <p:cTn id="18" dur="1" fill="hold">
+                                          <p:stCondLst>
+                                            <p:cond delay="0"/>
+                                          </p:stCondLst>
+                                        </p:cTn>
+                                        <p:tgtEl>
+                                          <p:spTgt spid="81"/>
+                                        </p:tgtEl>
+                                        <p:attrNameLst>
+                                          <p:attrName>style.visibility</p:attrName>
+                                        </p:attrNameLst>
+                                      </p:cBhvr>
+                                      <p:to>
+                                        <p:strVal val="visible"/>
+                                      </p:to>
+                                    </p:set>
+                                  </p:childTnLst>
+                                </p:cTn>
+                              </p:par>
+                            </p:childTnLst>
+                          </p:cTn>
+                        </p:par>
+                      </p:childTnLst>
+                    </p:cTn>
+                  </p:par>
+                  <p:par>
+                    <p:cTn id="19" fill="hold">
+                      <p:stCondLst>
+                        <p:cond delay="indefinite"/>
+                      </p:stCondLst>
+                      <p:childTnLst>
+                        <p:par>
+                          <p:cTn id="20" fill="hold">
+                            <p:stCondLst>
+                              <p:cond delay="0"/>
+                            </p:stCondLst>
+                            <p:childTnLst>
+                              <p:par>
+                                <p:cTn id="21" presetID="1" presetClass="entr" presetSubtype="0" fill="hold" nodeType="clickEffect">
+                                  <p:stCondLst>
+                                    <p:cond delay="0"/>
+                                  </p:stCondLst>
+                                  <p:childTnLst>
+                                    <p:set>
+                                      <p:cBhvr>
+                                        <p:cTn id="22" dur="1" fill="hold">
+                                          <p:stCondLst>
+                                            <p:cond delay="0"/>
+                                          </p:stCondLst>
+                                        </p:cTn>
+                                        <p:tgtEl>
+                                          <p:spTgt spid="82"/>
+                                        </p:tgtEl>
+                                        <p:attrNameLst>
+                                          <p:attrName>style.visibility</p:attrName>
+                                        </p:attrNameLst>
+                                      </p:cBhvr>
+                                      <p:to>
+                                        <p:strVal val="visible"/>
+                                      </p:to>
+                                    </p:set>
+                                  </p:childTnLst>
+                                </p:cTn>
+                              </p:par>
+                            </p:childTnLst>
+                          </p:cTn>
+                        </p:par>
+                      </p:childTnLst>
+                    </p:cTn>
+                  </p:par>
+                  <p:par>
+                    <p:cTn id="23" fill="hold">
+                      <p:stCondLst>
+                        <p:cond delay="indefinite"/>
+                      </p:stCondLst>
+                      <p:childTnLst>
+                        <p:par>
+                          <p:cTn id="24" fill="hold">
+                            <p:stCondLst>
+                              <p:cond delay="0"/>
+                            </p:stCondLst>
+                            <p:childTnLst>
+                              <p:par>
+                                <p:cTn id="25" presetID="1" presetClass="entr" presetSubtype="0" fill="hold" nodeType="clickEffect">
+                                  <p:stCondLst>
+                                    <p:cond delay="0"/>
+                                  </p:stCondLst>
+                                  <p:childTnLst>
+                                    <p:set>
+                                      <p:cBhvr>
+                                        <p:cTn id="26" dur="1" fill="hold">
+                                          <p:stCondLst>
+                                            <p:cond delay="0"/>
+                                          </p:stCondLst>
+                                        </p:cTn>
+                                        <p:tgtEl>
+                                          <p:spTgt spid="30"/>
+                                        </p:tgtEl>
+                                        <p:attrNameLst>
+                                          <p:attrName>style.visibility</p:attrName>
+                                        </p:attrNameLst>
+                                      </p:cBhvr>
+                                      <p:to>
+                                        <p:strVal val="visible"/>
+                                      </p:to>
+                                    </p:set>
+                                  </p:childTnLst>
+                                </p:cTn>
+                              </p:par>
+                              <p:par>
+                                <p:cTn id="27" presetID="1" presetClass="entr" presetSubtype="0" fill="hold" grpId="0" nodeType="withEffect">
+                                  <p:stCondLst>
+                                    <p:cond delay="0"/>
+                                  </p:stCondLst>
+                                  <p:childTnLst>
+                                    <p:set>
+                                      <p:cBhvr>
+                                        <p:cTn id="28" dur="1" fill="hold">
+                                          <p:stCondLst>
+                                            <p:cond delay="0"/>
+                                          </p:stCondLst>
+                                        </p:cTn>
+                                        <p:tgtEl>
+                                          <p:spTgt spid="18"/>
+                                        </p:tgtEl>
+                                        <p:attrNameLst>
+                                          <p:attrName>style.visibility</p:attrName>
+                                        </p:attrNameLst>
+                                      </p:cBhvr>
+                                      <p:to>
+                                        <p:strVal val="visible"/>
+                                      </p:to>
+                                    </p:set>
+                                  </p:childTnLst>
+                                </p:cTn>
+                              </p:par>
+                            </p:childTnLst>
+                          </p:cTn>
+                        </p:par>
+                      </p:childTnLst>
+                    </p:cTn>
+                  </p:par>
+                  <p:par>
+                    <p:cTn id="29" fill="hold">
+                      <p:stCondLst>
+                        <p:cond delay="indefinite"/>
+                      </p:stCondLst>
+                      <p:childTnLst>
+                        <p:par>
+                          <p:cTn id="30" fill="hold">
+                            <p:stCondLst>
+                              <p:cond delay="0"/>
+                            </p:stCondLst>
+                            <p:childTnLst>
+                              <p:par>
+                                <p:cTn id="31" presetID="1" presetClass="entr" presetSubtype="0" fill="hold" grpId="0" nodeType="clickEffect">
+                                  <p:stCondLst>
+                                    <p:cond delay="0"/>
+                                  </p:stCondLst>
+                                  <p:childTnLst>
+                                    <p:set>
+                                      <p:cBhvr>
+                                        <p:cTn id="32" dur="1" fill="hold">
+                                          <p:stCondLst>
+                                            <p:cond delay="0"/>
+                                          </p:stCondLst>
+                                        </p:cTn>
+                                        <p:tgtEl>
+                                          <p:spTgt spid="5"/>
+                                        </p:tgtEl>
+                                        <p:attrNameLst>
+                                          <p:attrName>style.visibility</p:attrName>
+                                        </p:attrNameLst>
+                                      </p:cBhvr>
+                                      <p:to>
+                                        <p:strVal val="visible"/>
+                                      </p:to>
+                                    </p:set>
+                                  </p:childTnLst>
+                                </p:cTn>
+                              </p:par>
+                              <p:par>
+                                <p:cTn id="33" presetID="1" presetClass="entr" presetSubtype="0" fill="hold" nodeType="withEffect">
+                                  <p:stCondLst>
+                                    <p:cond delay="0"/>
+                                  </p:stCondLst>
+                                  <p:childTnLst>
+                                    <p:set>
+                                      <p:cBhvr>
+                                        <p:cTn id="34" dur="1" fill="hold">
+                                          <p:stCondLst>
+                                            <p:cond delay="0"/>
+                                          </p:stCondLst>
+                                        </p:cTn>
+                                        <p:tgtEl>
+                                          <p:spTgt spid="22"/>
+                                        </p:tgtEl>
+                                        <p:attrNameLst>
+                                          <p:attrName>style.visibility</p:attrName>
+                                        </p:attrNameLst>
+                                      </p:cBhvr>
+                                      <p:to>
+                                        <p:strVal val="visible"/>
+                                      </p:to>
+                                    </p:set>
+                                  </p:childTnLst>
+                                </p:cTn>
+                              </p:par>
+                              <p:par>
+                                <p:cTn id="35" presetID="1" presetClass="entr" presetSubtype="0" fill="hold" nodeType="withEffect">
+                                  <p:stCondLst>
+                                    <p:cond delay="0"/>
+                                  </p:stCondLst>
+                                  <p:childTnLst>
+                                    <p:set>
+                                      <p:cBhvr>
+                                        <p:cTn id="36" dur="1" fill="hold">
+                                          <p:stCondLst>
+                                            <p:cond delay="0"/>
+                                          </p:stCondLst>
+                                        </p:cTn>
+                                        <p:tgtEl>
+                                          <p:spTgt spid="20"/>
+                                        </p:tgtEl>
+                                        <p:attrNameLst>
+                                          <p:attrName>style.visibility</p:attrName>
+                                        </p:attrNameLst>
+                                      </p:cBhvr>
+                                      <p:to>
+                                        <p:strVal val="visible"/>
+                                      </p:to>
+                                    </p:set>
+                                  </p:childTnLst>
+                                </p:cTn>
+                              </p:par>
+                              <p:par>
+                                <p:cTn id="37" presetID="1" presetClass="entr" presetSubtype="0" fill="hold" nodeType="withEffect">
+                                  <p:stCondLst>
+                                    <p:cond delay="0"/>
+                                  </p:stCondLst>
+                                  <p:childTnLst>
+                                    <p:set>
+                                      <p:cBhvr>
+                                        <p:cTn id="38" dur="1" fill="hold">
+                                          <p:stCondLst>
+                                            <p:cond delay="0"/>
+                                          </p:stCondLst>
+                                        </p:cTn>
+                                        <p:tgtEl>
+                                          <p:spTgt spid="8"/>
+                                        </p:tgtEl>
+                                        <p:attrNameLst>
+                                          <p:attrName>style.visibility</p:attrName>
+                                        </p:attrNameLst>
+                                      </p:cBhvr>
+                                      <p:to>
+                                        <p:strVal val="visible"/>
+                                      </p:to>
+                                    </p:set>
+                                  </p:childTnLst>
+                                </p:cTn>
+                              </p:par>
+                            </p:childTnLst>
+                          </p:cTn>
+                        </p:par>
+                      </p:childTnLst>
+                    </p:cTn>
+                  </p:par>
+                  <p:par>
+                    <p:cTn id="39" fill="hold">
+                      <p:stCondLst>
+                        <p:cond delay="indefinite"/>
+                      </p:stCondLst>
+                      <p:childTnLst>
+                        <p:par>
+                          <p:cTn id="40" fill="hold">
+                            <p:stCondLst>
+                              <p:cond delay="0"/>
+                            </p:stCondLst>
+                            <p:childTnLst>
+                              <p:par>
+                                <p:cTn id="41" presetID="1" presetClass="entr" presetSubtype="0" fill="hold" nodeType="clickEffect">
+                                  <p:stCondLst>
+                                    <p:cond delay="0"/>
+                                  </p:stCondLst>
+                                  <p:childTnLst>
+                                    <p:set>
+                                      <p:cBhvr>
+                                        <p:cTn id="42" dur="1" fill="hold">
+                                          <p:stCondLst>
+                                            <p:cond delay="0"/>
+                                          </p:stCondLst>
+                                        </p:cTn>
+                                        <p:tgtEl>
+                                          <p:spTgt spid="76"/>
+                                        </p:tgtEl>
+                                        <p:attrNameLst>
+                                          <p:attrName>style.visibility</p:attrName>
+                                        </p:attrNameLst>
+                                      </p:cBhvr>
+                                      <p:to>
+                                        <p:strVal val="visible"/>
+                                      </p:to>
+                                    </p:set>
+                                  </p:childTnLst>
+                                </p:cTn>
+                              </p:par>
+                              <p:par>
+                                <p:cTn id="43" presetID="1" presetClass="entr" presetSubtype="0" fill="hold" grpId="0" nodeType="withEffect">
+                                  <p:stCondLst>
+                                    <p:cond delay="0"/>
+                                  </p:stCondLst>
+                                  <p:childTnLst>
+                                    <p:set>
+                                      <p:cBhvr>
+                                        <p:cTn id="44" dur="1" fill="hold">
+                                          <p:stCondLst>
+                                            <p:cond delay="0"/>
+                                          </p:stCondLst>
+                                        </p:cTn>
+                                        <p:tgtEl>
+                                          <p:spTgt spid="74"/>
+                                        </p:tgtEl>
+                                        <p:attrNameLst>
+                                          <p:attrName>style.visibility</p:attrName>
+                                        </p:attrNameLst>
+                                      </p:cBhvr>
+                                      <p:to>
+                                        <p:strVal val="visible"/>
+                                      </p:to>
+                                    </p:set>
+                                  </p:childTnLst>
+                                </p:cTn>
+                              </p:par>
+                            </p:childTnLst>
+                          </p:cTn>
+                        </p:par>
+                      </p:childTnLst>
+                    </p:cTn>
+                  </p:par>
+                </p:childTnLst>
+              </p:cTn>
+              <p:prevCondLst>
+                <p:cond evt="onPrev" delay="0">
+                  <p:tgtEl>
+                    <p:sldTgt/>
+                  </p:tgtEl>
+                </p:cond>
+              </p:prevCondLst>
+              <p:nextCondLst>
+                <p:cond evt="onNext" delay="0">
+                  <p:tgtEl>
+                    <p:sldTgt/>
+                  </p:tgtEl>
+                </p:cond>
+              </p:nextCondLst>
+            </p:seq>
+          </p:childTnLst>
+        </p:cTn>
+      </p:par>
+    </p:tnLst>
+    <p:bldLst>
+      <p:bldP spid="5" grpId="0" animBg="1"/>
+      <p:bldP spid="18" grpId="0" animBg="1"/>
+      <p:bldP spid="33" grpId="0" animBg="1"/>
+      <p:bldP spid="74" grpId="0" animBg="1"/>
+    </p:bldLst>
+  </p:timing>
 </p:sld>
 </file>
 

</xml_diff>